<commit_message>
parallel clrb code added
</commit_message>
<xml_diff>
--- a/meeting_032317.pptx
+++ b/meeting_032317.pptx
@@ -25869,7 +25869,7 @@
       </p:sp>
       <p:pic>
         <p:nvPicPr>
-          <p:cNvPr id="3" name="Picture 2"/>
+          <p:cNvPr id="9" name="Picture 8"/>
           <p:cNvPicPr>
             <a:picLocks noChangeAspect="1"/>
           </p:cNvPicPr>
@@ -25883,8 +25883,8 @@
         </p:blipFill>
         <p:spPr>
           <a:xfrm>
-            <a:off x="3007228" y="1924110"/>
-            <a:ext cx="6177534" cy="2489454"/>
+            <a:off x="3998399" y="4775798"/>
+            <a:ext cx="4195191" cy="537845"/>
           </a:xfrm>
           <a:prstGeom prst="rect">
             <a:avLst/>
@@ -25893,7 +25893,7 @@
       </p:pic>
       <p:pic>
         <p:nvPicPr>
-          <p:cNvPr id="9" name="Picture 8"/>
+          <p:cNvPr id="5" name="Picture 4"/>
           <p:cNvPicPr>
             <a:picLocks noChangeAspect="1"/>
           </p:cNvPicPr>
@@ -25907,8 +25907,8 @@
         </p:blipFill>
         <p:spPr>
           <a:xfrm>
-            <a:off x="3998399" y="4775798"/>
-            <a:ext cx="4195191" cy="537845"/>
+            <a:off x="2653786" y="1736297"/>
+            <a:ext cx="6884416" cy="2489454"/>
           </a:xfrm>
           <a:prstGeom prst="rect">
             <a:avLst/>

</xml_diff>